<commit_message>
data.table cheat sheet (version 1.2)
</commit_message>
<xml_diff>
--- a/powerpoints/datatable.pptx
+++ b/powerpoints/datatable.pptx
@@ -418,7 +418,7 @@
           <a:p>
             <a:fld id="{14A1A45B-F66E-48A2-89C5-3AD170776287}" type="datetimeFigureOut">
               <a:rPr lang="da-DK" smtClean="0"/>
-              <a:t>23/08/2018</a:t>
+              <a:t>26/08/2018</a:t>
             </a:fld>
             <a:endParaRPr lang="da-DK"/>
           </a:p>
@@ -3488,7 +3488,7 @@
             <a:avLst/>
           </a:prstGeom>
           <a:solidFill>
-            <a:srgbClr val="F5F5F5"/>
+            <a:srgbClr val="F3F3F3"/>
           </a:solidFill>
           <a:ln w="12700">
             <a:miter lim="400000"/>
@@ -3869,7 +3869,7 @@
                   <a:srgbClr val="5B6167"/>
                 </a:solidFill>
               </a:rPr>
-              <a:t>8-23</a:t>
+              <a:t>8-26</a:t>
             </a:r>
             <a:endParaRPr dirty="0">
               <a:solidFill>
@@ -4571,7 +4571,7 @@
                   <a:srgbClr val="000000"/>
                 </a:solidFill>
               </a:rPr>
-              <a:t>a = c(1, 2), b = c(“a”, “b”)</a:t>
+              <a:t>a = c(1, 2), b = c("a", "b")</a:t>
             </a:r>
             <a:r>
               <a:rPr lang="en-US" dirty="0">
@@ -5049,7 +5049,7 @@
                   <a:srgbClr val="000000"/>
                 </a:solidFill>
               </a:rPr>
-              <a:t>, ] – subset rows based on the values in one or more columns.</a:t>
+              <a:t>, ] – subset rows based on values in one or more columns.</a:t>
             </a:r>
             <a:endParaRPr lang="da-DK" b="0" dirty="0">
               <a:solidFill>
@@ -6107,7 +6107,7 @@
                   <a:srgbClr val="000000"/>
                 </a:solidFill>
               </a:rPr>
-              <a:t>] – select column(s) by number. Prefix column numbers with “-” to deselect.</a:t>
+              <a:t>] – extract column(s) by number. Prefix column numbers with “-” to drop.</a:t>
             </a:r>
           </a:p>
         </p:txBody>
@@ -6730,7 +6730,7 @@
                   <a:srgbClr val="000000"/>
                 </a:solidFill>
               </a:rPr>
-              <a:t>] – select column(s) by name</a:t>
+              <a:t>] – extract column(s) by name</a:t>
             </a:r>
             <a:r>
               <a:rPr lang="en-US" b="0" dirty="0">
@@ -9659,7 +9659,7 @@
         <p:spPr>
           <a:xfrm>
             <a:off x="10957082" y="5895713"/>
-            <a:ext cx="2763316" cy="498598"/>
+            <a:ext cx="2763316" cy="664797"/>
           </a:xfrm>
           <a:prstGeom prst="rect">
             <a:avLst/>
@@ -9745,7 +9745,7 @@
                 </a:solidFill>
                 <a:cs typeface="Helvetica" panose="020B0604020202020204" pitchFamily="34" charset="0"/>
               </a:rPr>
-              <a:t> – arrange the rows of a data.table. Prefix variable names with “</a:t>
+              <a:t> – reorder a data.table according to specified columns. Prefix column names with “</a:t>
             </a:r>
             <a:r>
               <a:rPr lang="en-US" dirty="0">
@@ -10684,7 +10684,7 @@
         <p:spPr>
           <a:xfrm>
             <a:off x="9357554" y="5560638"/>
-            <a:ext cx="1183978" cy="276999"/>
+            <a:ext cx="749564" cy="276999"/>
           </a:xfrm>
           <a:prstGeom prst="rect">
             <a:avLst/>
@@ -10699,7 +10699,7 @@
             <a:pPr lvl="1" indent="0"/>
             <a:r>
               <a:rPr lang="da-DK" dirty="0"/>
-              <a:t>ARRANGE ROWS</a:t>
+              <a:t>REORDER</a:t>
             </a:r>
           </a:p>
         </p:txBody>
@@ -10759,7 +10759,7 @@
         </p:nvSpPr>
         <p:spPr>
           <a:xfrm>
-            <a:off x="10957082" y="7040286"/>
+            <a:off x="10957082" y="7116486"/>
             <a:ext cx="2763316" cy="498598"/>
           </a:xfrm>
           <a:prstGeom prst="rect">
@@ -10794,12 +10794,20 @@
               <a:t>unique(</a:t>
             </a:r>
             <a:r>
+              <a:rPr lang="en-US" b="0" dirty="0" err="1">
+                <a:solidFill>
+                  <a:srgbClr val="000000"/>
+                </a:solidFill>
+              </a:rPr>
+              <a:t>dt</a:t>
+            </a:r>
+            <a:r>
               <a:rPr lang="en-US" b="0" dirty="0">
                 <a:solidFill>
                   <a:srgbClr val="000000"/>
                 </a:solidFill>
               </a:rPr>
-              <a:t>dt, a, b</a:t>
+              <a:t>, by = c("a", "b")</a:t>
             </a:r>
             <a:r>
               <a:rPr lang="en-US" dirty="0">
@@ -10815,7 +10823,7 @@
                   <a:srgbClr val="000000"/>
                 </a:solidFill>
               </a:rPr>
-              <a:t> – extract a subset of the data based on a unique combination of values.</a:t>
+              <a:t> – extract unique rows based on columns specified in “by”. Leave out “by” to use all columns.</a:t>
             </a:r>
           </a:p>
         </p:txBody>
@@ -10827,13 +10835,13 @@
           <p:nvPr>
             <p:extLst>
               <p:ext uri="{D42A27DB-BD31-4B8C-83A1-F6EECF244321}">
-                <p14:modId xmlns:p14="http://schemas.microsoft.com/office/powerpoint/2010/main" val="2815637385"/>
+                <p14:modId xmlns:p14="http://schemas.microsoft.com/office/powerpoint/2010/main" val="701060044"/>
               </p:ext>
             </p:extLst>
           </p:nvPr>
         </p:nvGraphicFramePr>
         <p:xfrm>
-          <a:off x="10156338" y="7077802"/>
+          <a:off x="10156338" y="7154002"/>
           <a:ext cx="453600" cy="609600"/>
         </p:xfrm>
         <a:graphic>
@@ -11256,7 +11264,7 @@
         </p:nvSpPr>
         <p:spPr>
           <a:xfrm>
-            <a:off x="9928849" y="7235416"/>
+            <a:off x="9928849" y="7311616"/>
             <a:ext cx="136800" cy="0"/>
           </a:xfrm>
           <a:prstGeom prst="line">
@@ -11309,13 +11317,13 @@
           <p:nvPr>
             <p:extLst>
               <p:ext uri="{D42A27DB-BD31-4B8C-83A1-F6EECF244321}">
-                <p14:modId xmlns:p14="http://schemas.microsoft.com/office/powerpoint/2010/main" val="320809421"/>
+                <p14:modId xmlns:p14="http://schemas.microsoft.com/office/powerpoint/2010/main" val="2741037434"/>
               </p:ext>
             </p:extLst>
           </p:nvPr>
         </p:nvGraphicFramePr>
         <p:xfrm>
-          <a:off x="9357554" y="7077803"/>
+          <a:off x="9357554" y="7154003"/>
           <a:ext cx="453600" cy="762000"/>
         </p:xfrm>
         <a:graphic>
@@ -11832,8 +11840,8 @@
         </p:nvSpPr>
         <p:spPr>
           <a:xfrm>
-            <a:off x="9357554" y="6749944"/>
-            <a:ext cx="1100622" cy="276999"/>
+            <a:off x="9357554" y="6826144"/>
+            <a:ext cx="1078180" cy="276999"/>
           </a:xfrm>
           <a:prstGeom prst="rect">
             <a:avLst/>
@@ -11848,7 +11856,7 @@
             <a:pPr lvl="1" indent="0"/>
             <a:r>
               <a:rPr lang="da-DK" dirty="0"/>
-              <a:t>UNIQUE CASES</a:t>
+              <a:t>UNIQUE ROWS</a:t>
             </a:r>
           </a:p>
         </p:txBody>
@@ -11861,7 +11869,7 @@
         </p:nvSpPr>
         <p:spPr>
           <a:xfrm>
-            <a:off x="9357554" y="6732059"/>
+            <a:off x="9357554" y="6808259"/>
             <a:ext cx="4320000" cy="797"/>
           </a:xfrm>
           <a:prstGeom prst="line">
@@ -13333,7 +13341,7 @@
         </p:nvSpPr>
         <p:spPr>
           <a:xfrm>
-            <a:off x="9357554" y="8082223"/>
+            <a:off x="9357554" y="8096431"/>
             <a:ext cx="4320000" cy="590931"/>
           </a:xfrm>
           <a:prstGeom prst="rect">
@@ -13381,7 +13389,7 @@
                   <a:srgbClr val="000000"/>
                 </a:solidFill>
               </a:rPr>
-              <a:t>, by = c(“a”, “b”)</a:t>
+              <a:t>, by = c("a", "b")</a:t>
             </a:r>
             <a:r>
               <a:rPr lang="en-US" dirty="0">
@@ -13397,7 +13405,7 @@
                   <a:srgbClr val="000000"/>
                 </a:solidFill>
               </a:rPr>
-              <a:t> – return the number of unique rows, based on columns specified in “by”. Leave out “by” to use all columns.</a:t>
+              <a:t> – return the number of unique rows based on columns specified in “by”. Leave out “by” to use all columns. </a:t>
             </a:r>
           </a:p>
         </p:txBody>
@@ -15788,7 +15796,7 @@
         </p:nvSpPr>
         <p:spPr>
           <a:xfrm>
-            <a:off x="9357554" y="8786963"/>
+            <a:off x="9357554" y="8870113"/>
             <a:ext cx="4320000" cy="1348679"/>
           </a:xfrm>
           <a:prstGeom prst="rect">
@@ -15797,10 +15805,10 @@
           <a:gradFill flip="none" rotWithShape="1">
             <a:gsLst>
               <a:gs pos="0">
-                <a:srgbClr val="F5F5F5"/>
+                <a:srgbClr val="F3F3F3"/>
               </a:gs>
               <a:gs pos="38000">
-                <a:srgbClr val="F5F5F5"/>
+                <a:srgbClr val="F3F3F3"/>
               </a:gs>
               <a:gs pos="100000">
                 <a:schemeClr val="bg1"/>
@@ -15848,7 +15856,7 @@
         </p:nvSpPr>
         <p:spPr>
           <a:xfrm>
-            <a:off x="9513344" y="8901334"/>
+            <a:off x="9513344" y="8984484"/>
             <a:ext cx="4130480" cy="1195041"/>
           </a:xfrm>
           <a:prstGeom prst="rect">
@@ -16341,13 +16349,18 @@
               <a:t>Updated</a:t>
             </a:r>
             <a:r>
-              <a:rPr lang="da-DK" dirty="0">
+              <a:rPr lang="da-DK">
                 <a:solidFill>
                   <a:srgbClr val="5B6167"/>
                 </a:solidFill>
               </a:rPr>
-              <a:t>: 2018-08-23</a:t>
-            </a:r>
+              <a:t>: 2018-08-26</a:t>
+            </a:r>
+            <a:endParaRPr lang="da-DK" dirty="0">
+              <a:solidFill>
+                <a:srgbClr val="5B6167"/>
+              </a:solidFill>
+            </a:endParaRPr>
           </a:p>
         </p:txBody>
       </p:sp>
@@ -16674,20 +16687,12 @@
               <a:t>] – join two data.tables based on rows with equal values. </a:t>
             </a:r>
             <a:r>
-              <a:rPr lang="en-US" b="0" dirty="0" err="1">
+              <a:rPr lang="en-US" b="0" dirty="0">
                 <a:solidFill>
                   <a:srgbClr val="5B6167"/>
                 </a:solidFill>
               </a:rPr>
-              <a:t>setkey</a:t>
-            </a:r>
-            <a:r>
-              <a:rPr lang="en-US" b="0" dirty="0">
-                <a:solidFill>
-                  <a:srgbClr val="5B6167"/>
-                </a:solidFill>
-              </a:rPr>
-              <a:t>() can be used in stead of “.on”.</a:t>
+              <a:t>You can leave out “on” if keys are already set.</a:t>
             </a:r>
           </a:p>
         </p:txBody>
@@ -18143,7 +18148,7 @@
                   <a:srgbClr val="000000"/>
                 </a:solidFill>
               </a:rPr>
-              <a:t>] – join two data.tables based on rows with equal and unequal values</a:t>
+              <a:t>] – join two data.tables based on rows with equal and unequal values.</a:t>
             </a:r>
           </a:p>
         </p:txBody>
@@ -19154,7 +19159,7 @@
           <p:nvPr>
             <p:extLst>
               <p:ext uri="{D42A27DB-BD31-4B8C-83A1-F6EECF244321}">
-                <p14:modId xmlns:p14="http://schemas.microsoft.com/office/powerpoint/2010/main" val="1979969576"/>
+                <p14:modId xmlns:p14="http://schemas.microsoft.com/office/powerpoint/2010/main" val="2882807153"/>
               </p:ext>
             </p:extLst>
           </p:nvPr>
@@ -19248,7 +19253,7 @@
                   </a:txBody>
                   <a:tcPr marL="0" marR="0" marT="0" marB="0" anchor="ctr" horzOverflow="overflow">
                     <a:solidFill>
-                      <a:srgbClr val="A6AAA9"/>
+                      <a:srgbClr val="BD8324"/>
                     </a:solidFill>
                   </a:tcPr>
                 </a:tc>
@@ -19302,9 +19307,7 @@
                   </a:txBody>
                   <a:tcPr marL="0" marR="0" marT="0" marB="0" anchor="ctr" horzOverflow="overflow">
                     <a:solidFill>
-                      <a:schemeClr val="accent3">
-                        <a:lumMod val="50000"/>
-                      </a:schemeClr>
+                      <a:srgbClr val="A6AAA9"/>
                     </a:solidFill>
                   </a:tcPr>
                 </a:tc>
@@ -19379,7 +19382,7 @@
                   </a:txBody>
                   <a:tcPr marL="0" marR="0" marT="0" marB="0" anchor="ctr" horzOverflow="overflow">
                     <a:solidFill>
-                      <a:srgbClr val="D8D8D8"/>
+                      <a:srgbClr val="F3CC86"/>
                     </a:solidFill>
                   </a:tcPr>
                 </a:tc>
@@ -19449,9 +19452,7 @@
                   </a:txBody>
                   <a:tcPr marL="0" marR="0" marT="0" marB="0" anchor="ctr" horzOverflow="overflow">
                     <a:solidFill>
-                      <a:schemeClr val="accent3">
-                        <a:lumMod val="90000"/>
-                      </a:schemeClr>
+                      <a:srgbClr val="D8D8D8"/>
                     </a:solidFill>
                   </a:tcPr>
                 </a:tc>
@@ -19526,7 +19527,7 @@
                   </a:txBody>
                   <a:tcPr marL="0" marR="0" marT="0" marB="0" anchor="ctr" horzOverflow="overflow">
                     <a:solidFill>
-                      <a:srgbClr val="D8D8D8"/>
+                      <a:srgbClr val="F3CC86"/>
                     </a:solidFill>
                   </a:tcPr>
                 </a:tc>
@@ -19596,9 +19597,7 @@
                   </a:txBody>
                   <a:tcPr marL="0" marR="0" marT="0" marB="0" anchor="ctr" horzOverflow="overflow">
                     <a:solidFill>
-                      <a:schemeClr val="accent3">
-                        <a:lumMod val="90000"/>
-                      </a:schemeClr>
+                      <a:srgbClr val="D8D8D8"/>
                     </a:solidFill>
                   </a:tcPr>
                 </a:tc>
@@ -19673,7 +19672,7 @@
                   </a:txBody>
                   <a:tcPr marL="0" marR="0" marT="0" marB="0" anchor="ctr" horzOverflow="overflow">
                     <a:solidFill>
-                      <a:srgbClr val="D8D8D8"/>
+                      <a:srgbClr val="F3CC86"/>
                     </a:solidFill>
                   </a:tcPr>
                 </a:tc>
@@ -19743,9 +19742,7 @@
                   </a:txBody>
                   <a:tcPr marL="0" marR="0" marT="0" marB="0" anchor="ctr" horzOverflow="overflow">
                     <a:solidFill>
-                      <a:schemeClr val="accent3">
-                        <a:lumMod val="90000"/>
-                      </a:schemeClr>
+                      <a:srgbClr val="D8D8D8"/>
                     </a:solidFill>
                   </a:tcPr>
                 </a:tc>
@@ -19844,7 +19841,7 @@
                   <a:srgbClr val="000000"/>
                 </a:solidFill>
               </a:rPr>
-              <a:t>By default, a rolling join matches rows, defined by an id variable, but only keeps the most recent preceding match with the left table, defined by a date variable.</a:t>
+              <a:t>By default, a rolling join matches rows, according to id columns, but only keeps the most recent preceding match with the left table, according to date columns.</a:t>
             </a:r>
           </a:p>
         </p:txBody>
@@ -19937,7 +19934,7 @@
                   <a:srgbClr val="000000"/>
                 </a:solidFill>
               </a:rPr>
-              <a:t>– combine rows of two data.tables</a:t>
+              <a:t>– combine rows of two data.tables.</a:t>
             </a:r>
             <a:endParaRPr lang="en-US" dirty="0">
               <a:solidFill>
@@ -20838,7 +20835,7 @@
                   <a:srgbClr val="000000"/>
                 </a:solidFill>
               </a:rPr>
-              <a:t>– combine columns of two data.tables</a:t>
+              <a:t>– combine columns of two data.tables.</a:t>
             </a:r>
             <a:endParaRPr lang="en-US" dirty="0">
               <a:solidFill>
@@ -21907,7 +21904,7 @@
           <p:nvPr>
             <p:extLst>
               <p:ext uri="{D42A27DB-BD31-4B8C-83A1-F6EECF244321}">
-                <p14:modId xmlns:p14="http://schemas.microsoft.com/office/powerpoint/2010/main" val="2384305474"/>
+                <p14:modId xmlns:p14="http://schemas.microsoft.com/office/powerpoint/2010/main" val="1940586252"/>
               </p:ext>
             </p:extLst>
           </p:nvPr>
@@ -22172,7 +22169,7 @@
                   </a:txBody>
                   <a:tcPr marL="0" marR="0" marT="0" marB="0" anchor="ctr" horzOverflow="overflow">
                     <a:solidFill>
-                      <a:srgbClr val="F4CD81"/>
+                      <a:srgbClr val="D8D8D8"/>
                     </a:solidFill>
                   </a:tcPr>
                 </a:tc>
@@ -22499,7 +22496,7 @@
                   </a:txBody>
                   <a:tcPr marL="0" marR="0" marT="0" marB="0" anchor="ctr" horzOverflow="overflow">
                     <a:solidFill>
-                      <a:srgbClr val="F4CD81"/>
+                      <a:srgbClr val="D8D8D8"/>
                     </a:solidFill>
                   </a:tcPr>
                 </a:tc>
@@ -22678,7 +22675,7 @@
           <p:nvPr>
             <p:extLst>
               <p:ext uri="{D42A27DB-BD31-4B8C-83A1-F6EECF244321}">
-                <p14:modId xmlns:p14="http://schemas.microsoft.com/office/powerpoint/2010/main" val="2193050652"/>
+                <p14:modId xmlns:p14="http://schemas.microsoft.com/office/powerpoint/2010/main" val="698063809"/>
               </p:ext>
             </p:extLst>
           </p:nvPr>
@@ -22834,7 +22831,7 @@
                   </a:txBody>
                   <a:tcPr marL="0" marR="0" marT="0" marB="0" anchor="ctr" horzOverflow="overflow">
                     <a:solidFill>
-                      <a:srgbClr val="F4CD81"/>
+                      <a:srgbClr val="D8D8D8"/>
                     </a:solidFill>
                   </a:tcPr>
                 </a:tc>
@@ -22943,7 +22940,7 @@
                   </a:txBody>
                   <a:tcPr marL="0" marR="0" marT="0" marB="0" anchor="ctr" horzOverflow="overflow">
                     <a:solidFill>
-                      <a:srgbClr val="F4CD81"/>
+                      <a:srgbClr val="D8D8D8"/>
                     </a:solidFill>
                   </a:tcPr>
                 </a:tc>
@@ -23032,7 +23029,7 @@
           <p:nvPr>
             <p:extLst>
               <p:ext uri="{D42A27DB-BD31-4B8C-83A1-F6EECF244321}">
-                <p14:modId xmlns:p14="http://schemas.microsoft.com/office/powerpoint/2010/main" val="1487612947"/>
+                <p14:modId xmlns:p14="http://schemas.microsoft.com/office/powerpoint/2010/main" val="3825382795"/>
               </p:ext>
             </p:extLst>
           </p:nvPr>
@@ -23221,7 +23218,7 @@
                   </a:txBody>
                   <a:tcPr marL="0" marR="0" marT="0" marB="0" anchor="ctr" horzOverflow="overflow">
                     <a:solidFill>
-                      <a:srgbClr val="F4CD81"/>
+                      <a:srgbClr val="D8D8D8"/>
                     </a:solidFill>
                   </a:tcPr>
                 </a:tc>
@@ -23323,7 +23320,7 @@
                   </a:txBody>
                   <a:tcPr marL="0" marR="0" marT="0" marB="0" anchor="ctr" horzOverflow="overflow">
                     <a:solidFill>
-                      <a:srgbClr val="F4CD81"/>
+                      <a:srgbClr val="D8D8D8"/>
                     </a:solidFill>
                   </a:tcPr>
                 </a:tc>
@@ -23364,7 +23361,7 @@
                   </a:txBody>
                   <a:tcPr marL="0" marR="0" marT="0" marB="0" anchor="ctr" horzOverflow="overflow">
                     <a:solidFill>
-                      <a:srgbClr val="F4CD81"/>
+                      <a:srgbClr val="D8D8D8"/>
                     </a:solidFill>
                   </a:tcPr>
                 </a:tc>
@@ -23466,7 +23463,7 @@
                   </a:txBody>
                   <a:tcPr marL="0" marR="0" marT="0" marB="0" anchor="ctr" horzOverflow="overflow">
                     <a:solidFill>
-                      <a:srgbClr val="F4CD81"/>
+                      <a:srgbClr val="D8D8D8"/>
                     </a:solidFill>
                   </a:tcPr>
                 </a:tc>
@@ -23888,23 +23885,7 @@
                   <a:srgbClr val="000000"/>
                 </a:solidFill>
               </a:rPr>
-              <a:t> – set keys in a </a:t>
-            </a:r>
-            <a:r>
-              <a:rPr lang="en-US" b="0" dirty="0" err="1">
-                <a:solidFill>
-                  <a:srgbClr val="000000"/>
-                </a:solidFill>
-              </a:rPr>
-              <a:t>data.table</a:t>
-            </a:r>
-            <a:r>
-              <a:rPr lang="en-US" b="0" dirty="0">
-                <a:solidFill>
-                  <a:srgbClr val="000000"/>
-                </a:solidFill>
-              </a:rPr>
-              <a:t> to enable faster repeated lookups in specified columns using “</a:t>
+              <a:t> – set keys in a data.table to enable faster repeated lookups in specified column(s) using “</a:t>
             </a:r>
             <a:r>
               <a:rPr lang="en-US" b="0" dirty="0" err="1">
@@ -24262,7 +24243,7 @@
         </p:nvSpPr>
         <p:spPr>
           <a:xfrm>
-            <a:off x="4812083" y="6801194"/>
+            <a:off x="4812083" y="6710591"/>
             <a:ext cx="4320000" cy="0"/>
           </a:xfrm>
           <a:prstGeom prst="line">
@@ -24309,7 +24290,7 @@
         </p:nvSpPr>
         <p:spPr>
           <a:xfrm>
-            <a:off x="4812083" y="6818600"/>
+            <a:off x="4812083" y="6727997"/>
             <a:ext cx="1964640" cy="276999"/>
           </a:xfrm>
           <a:prstGeom prst="rect">
@@ -24440,7 +24421,7 @@
                   <a:srgbClr val="000000"/>
                 </a:solidFill>
               </a:rPr>
-              <a:t> = c(“a”, “b”)</a:t>
+              <a:t> = c("a", "b")</a:t>
             </a:r>
             <a:r>
               <a:rPr lang="en-US" dirty="0">
@@ -25488,7 +25469,7 @@
                   <a:srgbClr val="000000"/>
                 </a:solidFill>
               </a:rPr>
-              <a:t> = c(“a”, “b”)</a:t>
+              <a:t> = c(</a:t>
             </a:r>
             <a:r>
               <a:rPr lang="en-US" b="0" dirty="0">
@@ -25496,7 +25477,71 @@
                   <a:srgbClr val="000000"/>
                 </a:solidFill>
               </a:rPr>
-              <a:t>] – convert designated columns to character</a:t>
+              <a:t>"</a:t>
+            </a:r>
+            <a:r>
+              <a:rPr lang="en-US" dirty="0">
+                <a:solidFill>
+                  <a:srgbClr val="000000"/>
+                </a:solidFill>
+              </a:rPr>
+              <a:t>a</a:t>
+            </a:r>
+            <a:r>
+              <a:rPr lang="en-US" b="0" dirty="0">
+                <a:solidFill>
+                  <a:srgbClr val="000000"/>
+                </a:solidFill>
+              </a:rPr>
+              <a:t>"</a:t>
+            </a:r>
+            <a:r>
+              <a:rPr lang="en-US" dirty="0">
+                <a:solidFill>
+                  <a:srgbClr val="000000"/>
+                </a:solidFill>
+              </a:rPr>
+              <a:t>, </a:t>
+            </a:r>
+            <a:r>
+              <a:rPr lang="en-US" b="0" dirty="0">
+                <a:solidFill>
+                  <a:srgbClr val="000000"/>
+                </a:solidFill>
+              </a:rPr>
+              <a:t>"</a:t>
+            </a:r>
+            <a:r>
+              <a:rPr lang="en-US" dirty="0">
+                <a:solidFill>
+                  <a:srgbClr val="000000"/>
+                </a:solidFill>
+              </a:rPr>
+              <a:t>b</a:t>
+            </a:r>
+            <a:r>
+              <a:rPr lang="en-US" b="0" dirty="0">
+                <a:solidFill>
+                  <a:srgbClr val="000000"/>
+                </a:solidFill>
+              </a:rPr>
+              <a:t>"</a:t>
+            </a:r>
+            <a:r>
+              <a:rPr lang="en-US" dirty="0">
+                <a:solidFill>
+                  <a:srgbClr val="000000"/>
+                </a:solidFill>
+              </a:rPr>
+              <a:t>)</a:t>
+            </a:r>
+            <a:r>
+              <a:rPr lang="en-US" b="0" dirty="0">
+                <a:solidFill>
+                  <a:srgbClr val="000000"/>
+                </a:solidFill>
+              </a:rPr>
+              <a:t>] – convert the type of the designated columns.</a:t>
             </a:r>
           </a:p>
         </p:txBody>
@@ -25619,7 +25664,7 @@
                   <a:srgbClr val="000000"/>
                 </a:solidFill>
               </a:rPr>
-              <a:t>, c(“a”,</a:t>
+              <a:t>, c("a",</a:t>
             </a:r>
             <a:r>
               <a:rPr lang="en-US" b="0" dirty="0">
@@ -25628,7 +25673,7 @@
                 </a:solidFill>
                 <a:sym typeface="Source Sans Pro Light"/>
               </a:rPr>
-              <a:t> “b”), c(“x”, “y”</a:t>
+              <a:t> </a:t>
             </a:r>
             <a:r>
               <a:rPr lang="en-US" b="0" dirty="0">
@@ -25636,23 +25681,108 @@
                   <a:srgbClr val="000000"/>
                 </a:solidFill>
               </a:rPr>
+              <a:t>"</a:t>
+            </a:r>
+            <a:r>
+              <a:rPr lang="en-US" b="0" dirty="0">
+                <a:solidFill>
+                  <a:srgbClr val="000000"/>
+                </a:solidFill>
+                <a:sym typeface="Source Sans Pro Light"/>
+              </a:rPr>
+              <a:t>b</a:t>
+            </a:r>
+            <a:r>
+              <a:rPr lang="en-US" b="0" dirty="0">
+                <a:solidFill>
+                  <a:srgbClr val="000000"/>
+                </a:solidFill>
+              </a:rPr>
+              <a:t>"</a:t>
+            </a:r>
+            <a:r>
+              <a:rPr lang="en-US" b="0" dirty="0">
+                <a:solidFill>
+                  <a:srgbClr val="000000"/>
+                </a:solidFill>
+                <a:sym typeface="Source Sans Pro Light"/>
+              </a:rPr>
+              <a:t>), c(</a:t>
+            </a:r>
+            <a:r>
+              <a:rPr lang="en-US" b="0" dirty="0">
+                <a:solidFill>
+                  <a:srgbClr val="000000"/>
+                </a:solidFill>
+              </a:rPr>
+              <a:t>"</a:t>
+            </a:r>
+            <a:r>
+              <a:rPr lang="en-US" b="0" dirty="0">
+                <a:solidFill>
+                  <a:srgbClr val="000000"/>
+                </a:solidFill>
+                <a:sym typeface="Source Sans Pro Light"/>
+              </a:rPr>
+              <a:t>x</a:t>
+            </a:r>
+            <a:r>
+              <a:rPr lang="en-US" b="0" dirty="0">
+                <a:solidFill>
+                  <a:srgbClr val="000000"/>
+                </a:solidFill>
+              </a:rPr>
+              <a:t>"</a:t>
+            </a:r>
+            <a:r>
+              <a:rPr lang="en-US" b="0" dirty="0">
+                <a:solidFill>
+                  <a:srgbClr val="000000"/>
+                </a:solidFill>
+                <a:sym typeface="Source Sans Pro Light"/>
+              </a:rPr>
+              <a:t>, </a:t>
+            </a:r>
+            <a:r>
+              <a:rPr lang="en-US" b="0" dirty="0">
+                <a:solidFill>
+                  <a:srgbClr val="000000"/>
+                </a:solidFill>
+              </a:rPr>
+              <a:t>"</a:t>
+            </a:r>
+            <a:r>
+              <a:rPr lang="en-US" b="0" dirty="0">
+                <a:solidFill>
+                  <a:srgbClr val="000000"/>
+                </a:solidFill>
+                <a:sym typeface="Source Sans Pro Light"/>
+              </a:rPr>
+              <a:t>y</a:t>
+            </a:r>
+            <a:r>
+              <a:rPr lang="en-US" b="0" dirty="0">
+                <a:solidFill>
+                  <a:srgbClr val="000000"/>
+                </a:solidFill>
+              </a:rPr>
+              <a:t>")</a:t>
+            </a:r>
+            <a:r>
+              <a:rPr lang="en-US" dirty="0">
+                <a:solidFill>
+                  <a:srgbClr val="000000"/>
+                </a:solidFill>
+              </a:rPr>
               <a:t>)</a:t>
             </a:r>
             <a:r>
-              <a:rPr lang="en-US" dirty="0">
-                <a:solidFill>
-                  <a:srgbClr val="000000"/>
-                </a:solidFill>
-              </a:rPr>
-              <a:t>)</a:t>
-            </a:r>
-            <a:r>
               <a:rPr lang="en-US" b="0" dirty="0">
                 <a:solidFill>
                   <a:srgbClr val="000000"/>
                 </a:solidFill>
               </a:rPr>
-              <a:t> – rename multiple columns</a:t>
+              <a:t> – rename column(s)</a:t>
             </a:r>
             <a:r>
               <a:rPr lang="en-US" b="0" dirty="0">
@@ -26906,7 +27036,7 @@
         </p:nvSpPr>
         <p:spPr>
           <a:xfrm>
-            <a:off x="6840570" y="7161729"/>
+            <a:off x="6840570" y="7071126"/>
             <a:ext cx="2573850" cy="988692"/>
           </a:xfrm>
           <a:prstGeom prst="rect">
@@ -27134,13 +27264,13 @@
           <p:nvPr>
             <p:extLst>
               <p:ext uri="{D42A27DB-BD31-4B8C-83A1-F6EECF244321}">
-                <p14:modId xmlns:p14="http://schemas.microsoft.com/office/powerpoint/2010/main" val="3689514735"/>
+                <p14:modId xmlns:p14="http://schemas.microsoft.com/office/powerpoint/2010/main" val="358622017"/>
               </p:ext>
             </p:extLst>
           </p:nvPr>
         </p:nvGraphicFramePr>
         <p:xfrm>
-          <a:off x="6210918" y="7161729"/>
+          <a:off x="6210918" y="7071126"/>
           <a:ext cx="567424" cy="762000"/>
         </p:xfrm>
         <a:graphic>
@@ -27874,7 +28004,7 @@
         </p:nvSpPr>
         <p:spPr>
           <a:xfrm>
-            <a:off x="6027674" y="7333310"/>
+            <a:off x="6027674" y="7242707"/>
             <a:ext cx="136800" cy="0"/>
           </a:xfrm>
           <a:prstGeom prst="line">
@@ -27927,13 +28057,13 @@
           <p:nvPr>
             <p:extLst>
               <p:ext uri="{D42A27DB-BD31-4B8C-83A1-F6EECF244321}">
-                <p14:modId xmlns:p14="http://schemas.microsoft.com/office/powerpoint/2010/main" val="3901906277"/>
+                <p14:modId xmlns:p14="http://schemas.microsoft.com/office/powerpoint/2010/main" val="781459449"/>
               </p:ext>
             </p:extLst>
           </p:nvPr>
         </p:nvGraphicFramePr>
         <p:xfrm>
-          <a:off x="4812083" y="7171318"/>
+          <a:off x="4812083" y="7080715"/>
           <a:ext cx="1185862" cy="457200"/>
         </p:xfrm>
         <a:graphic>
@@ -28482,7 +28612,7 @@
         </p:nvSpPr>
         <p:spPr>
           <a:xfrm>
-            <a:off x="4812083" y="8244795"/>
+            <a:off x="4812083" y="8154192"/>
             <a:ext cx="4717933" cy="276405"/>
           </a:xfrm>
           <a:prstGeom prst="rect">
@@ -28857,7 +28987,7 @@
                   <a:srgbClr val="000000"/>
                 </a:solidFill>
               </a:rPr>
-              <a:t>“</a:t>
+              <a:t>"</a:t>
             </a:r>
             <a:r>
               <a:rPr lang="en-US" b="0" dirty="0" err="1">
@@ -28873,7 +29003,7 @@
                   <a:srgbClr val="000000"/>
                 </a:solidFill>
               </a:rPr>
-              <a:t>”</a:t>
+              <a:t>"</a:t>
             </a:r>
             <a:r>
               <a:rPr lang="en-US" dirty="0">
@@ -28911,12 +29041,20 @@
               </a:lnSpc>
             </a:pPr>
             <a:r>
+              <a:rPr lang="en-US" dirty="0" err="1">
+                <a:solidFill>
+                  <a:srgbClr val="000000"/>
+                </a:solidFill>
+              </a:rPr>
+              <a:t>fread</a:t>
+            </a:r>
+            <a:r>
               <a:rPr lang="en-US" dirty="0">
                 <a:solidFill>
                   <a:srgbClr val="000000"/>
                 </a:solidFill>
               </a:rPr>
-              <a:t>fread(</a:t>
+              <a:t>(</a:t>
             </a:r>
             <a:r>
               <a:rPr lang="en-US" b="0" dirty="0">
@@ -28924,7 +29062,23 @@
                   <a:srgbClr val="000000"/>
                 </a:solidFill>
               </a:rPr>
-              <a:t>“file.csv”, cols = c(“a”, “b”)</a:t>
+              <a:t>"</a:t>
+            </a:r>
+            <a:r>
+              <a:rPr lang="en-US" b="0" dirty="0" err="1">
+                <a:solidFill>
+                  <a:srgbClr val="000000"/>
+                </a:solidFill>
+              </a:rPr>
+              <a:t>file.csv</a:t>
+            </a:r>
+            <a:r>
+              <a:rPr lang="en-US" b="0" dirty="0">
+                <a:solidFill>
+                  <a:srgbClr val="000000"/>
+                </a:solidFill>
+              </a:rPr>
+              <a:t>", select = c("a", "b")</a:t>
             </a:r>
             <a:r>
               <a:rPr lang="en-US" dirty="0">
@@ -28940,7 +29094,7 @@
                   <a:srgbClr val="000000"/>
                 </a:solidFill>
               </a:rPr>
-              <a:t>– read two columns named “a” and “b” from a file named “file.csv” in the working directory.</a:t>
+              <a:t>– read specified columns from a flat file into R.</a:t>
             </a:r>
           </a:p>
         </p:txBody>
@@ -29085,7 +29239,23 @@
                   <a:srgbClr val="000000"/>
                 </a:solidFill>
               </a:rPr>
-              <a:t>, file =“”</a:t>
+              <a:t>, file = "</a:t>
+            </a:r>
+            <a:r>
+              <a:rPr lang="en-US" b="0" dirty="0" err="1">
+                <a:solidFill>
+                  <a:srgbClr val="000000"/>
+                </a:solidFill>
+              </a:rPr>
+              <a:t>file.csv</a:t>
+            </a:r>
+            <a:r>
+              <a:rPr lang="en-US" b="0" dirty="0">
+                <a:solidFill>
+                  <a:srgbClr val="000000"/>
+                </a:solidFill>
+              </a:rPr>
+              <a:t>"</a:t>
             </a:r>
             <a:r>
               <a:rPr lang="en-US" dirty="0">
@@ -29230,7 +29400,23 @@
                   <a:srgbClr val="000000"/>
                 </a:solidFill>
               </a:rPr>
-              <a:t>() </a:t>
+              <a:t>(</a:t>
+            </a:r>
+            <a:r>
+              <a:rPr lang="en-US" b="0" dirty="0">
+                <a:solidFill>
+                  <a:srgbClr val="000000"/>
+                </a:solidFill>
+              </a:rPr>
+              <a:t>4</a:t>
+            </a:r>
+            <a:r>
+              <a:rPr lang="en-US" dirty="0">
+                <a:solidFill>
+                  <a:srgbClr val="000000"/>
+                </a:solidFill>
+              </a:rPr>
+              <a:t>) </a:t>
             </a:r>
             <a:r>
               <a:rPr lang="en-US" b="0" dirty="0">
@@ -29399,7 +29585,7 @@
                   <a:srgbClr val="000000"/>
                 </a:solidFill>
               </a:rPr>
-              <a:t>] – select the row with the highest value of within a column grouped according to b. Also works with </a:t>
+              <a:t>] – within groups, extract rows with the maximum value in a specified column. Also works with </a:t>
             </a:r>
             <a:r>
               <a:rPr lang="en-US" b="0" dirty="0" err="1">
@@ -29423,7 +29609,7 @@
                   <a:srgbClr val="5B6167"/>
                 </a:solidFill>
               </a:rPr>
-              <a:t>Similar to .SD[.N] and .SD[1] on page 1.</a:t>
+              <a:t>Similar to “.SD[.N]” and “.SD[1]”.</a:t>
             </a:r>
           </a:p>
         </p:txBody>
@@ -29443,14 +29629,14 @@
           <p:nvPr>
             <p:extLst>
               <p:ext uri="{D42A27DB-BD31-4B8C-83A1-F6EECF244321}">
-                <p14:modId xmlns:p14="http://schemas.microsoft.com/office/powerpoint/2010/main" val="3168877821"/>
+                <p14:modId xmlns:p14="http://schemas.microsoft.com/office/powerpoint/2010/main" val="1825687542"/>
               </p:ext>
             </p:extLst>
           </p:nvPr>
         </p:nvGraphicFramePr>
         <p:xfrm>
-          <a:off x="4812083" y="5596049"/>
-          <a:ext cx="4435491" cy="934826"/>
+          <a:off x="4812083" y="5624625"/>
+          <a:ext cx="4435491" cy="861674"/>
         </p:xfrm>
         <a:graphic>
           <a:graphicData uri="http://schemas.openxmlformats.org/drawingml/2006/table">
@@ -29480,7 +29666,14 @@
                     <a:bodyPr/>
                     <a:lstStyle/>
                     <a:p>
-                      <a:pPr algn="l"/>
+                      <a:pPr algn="l">
+                        <a:lnSpc>
+                          <a:spcPct val="90000"/>
+                        </a:lnSpc>
+                        <a:spcBef>
+                          <a:spcPts val="200"/>
+                        </a:spcBef>
+                      </a:pPr>
                       <a:r>
                         <a:rPr lang="en-US" sz="1200" b="0" dirty="0" err="1">
                           <a:solidFill>
@@ -29554,10 +29747,10 @@
                     <a:p>
                       <a:pPr marL="0" marR="0" lvl="0" indent="0" algn="l" defTabSz="584200" rtl="0" eaLnBrk="1" fontAlgn="auto" latinLnBrk="0" hangingPunct="1">
                         <a:lnSpc>
-                          <a:spcPct val="100000"/>
+                          <a:spcPct val="90000"/>
                         </a:lnSpc>
                         <a:spcBef>
-                          <a:spcPts val="0"/>
+                          <a:spcPts val="200"/>
                         </a:spcBef>
                         <a:spcAft>
                           <a:spcPts val="0"/>
@@ -29667,7 +29860,14 @@
                     <a:bodyPr/>
                     <a:lstStyle/>
                     <a:p>
-                      <a:pPr algn="l"/>
+                      <a:pPr algn="l">
+                        <a:lnSpc>
+                          <a:spcPct val="90000"/>
+                        </a:lnSpc>
+                        <a:spcBef>
+                          <a:spcPts val="200"/>
+                        </a:spcBef>
+                      </a:pPr>
                       <a:r>
                         <a:rPr lang="en-US" sz="1200" b="0" dirty="0">
                           <a:solidFill>
@@ -29741,10 +29941,10 @@
                     <a:p>
                       <a:pPr marL="0" marR="0" lvl="0" indent="0" algn="l" defTabSz="584200" rtl="0" eaLnBrk="1" fontAlgn="auto" latinLnBrk="0" hangingPunct="1">
                         <a:lnSpc>
-                          <a:spcPct val="100000"/>
+                          <a:spcPct val="90000"/>
                         </a:lnSpc>
                         <a:spcBef>
-                          <a:spcPts val="0"/>
+                          <a:spcPts val="200"/>
                         </a:spcBef>
                         <a:spcAft>
                           <a:spcPts val="0"/>
@@ -29827,7 +30027,14 @@
                     <a:bodyPr/>
                     <a:lstStyle/>
                     <a:p>
-                      <a:pPr algn="l"/>
+                      <a:pPr algn="l">
+                        <a:lnSpc>
+                          <a:spcPct val="90000"/>
+                        </a:lnSpc>
+                        <a:spcBef>
+                          <a:spcPts val="200"/>
+                        </a:spcBef>
+                      </a:pPr>
                       <a:r>
                         <a:rPr lang="en-US" sz="1200" b="0" dirty="0" err="1">
                           <a:solidFill>
@@ -29901,10 +30108,10 @@
                     <a:p>
                       <a:pPr marL="0" marR="0" lvl="0" indent="0" algn="l" defTabSz="584200" rtl="0" eaLnBrk="1" fontAlgn="auto" latinLnBrk="0" hangingPunct="1">
                         <a:lnSpc>
-                          <a:spcPct val="100000"/>
+                          <a:spcPct val="90000"/>
                         </a:lnSpc>
                         <a:spcBef>
-                          <a:spcPts val="0"/>
+                          <a:spcPts val="200"/>
                         </a:spcBef>
                         <a:spcAft>
                           <a:spcPts val="0"/>
@@ -30007,14 +30214,14 @@
           <p:nvPr>
             <p:extLst>
               <p:ext uri="{D42A27DB-BD31-4B8C-83A1-F6EECF244321}">
-                <p14:modId xmlns:p14="http://schemas.microsoft.com/office/powerpoint/2010/main" val="4035586782"/>
+                <p14:modId xmlns:p14="http://schemas.microsoft.com/office/powerpoint/2010/main" val="3204801653"/>
               </p:ext>
             </p:extLst>
           </p:nvPr>
         </p:nvGraphicFramePr>
         <p:xfrm>
-          <a:off x="4812083" y="8518228"/>
-          <a:ext cx="4571860" cy="1097280"/>
+          <a:off x="4812083" y="8456201"/>
+          <a:ext cx="4571860" cy="987552"/>
         </p:xfrm>
         <a:graphic>
           <a:graphicData uri="http://schemas.openxmlformats.org/drawingml/2006/table">
@@ -30044,9 +30251,16 @@
                     <a:bodyPr/>
                     <a:lstStyle/>
                     <a:p>
-                      <a:pPr algn="l"/>
+                      <a:pPr algn="l">
+                        <a:lnSpc>
+                          <a:spcPct val="90000"/>
+                        </a:lnSpc>
+                        <a:spcBef>
+                          <a:spcPts val="200"/>
+                        </a:spcBef>
+                      </a:pPr>
                       <a:r>
-                        <a:rPr lang="en-US" sz="1200" b="0">
+                        <a:rPr lang="en-US" sz="1200" b="0" dirty="0" err="1">
                           <a:solidFill>
                             <a:srgbClr val="5B6167"/>
                           </a:solidFill>
@@ -30118,10 +30332,10 @@
                     <a:p>
                       <a:pPr marL="0" marR="0" lvl="0" indent="0" algn="l" defTabSz="584200" rtl="0" eaLnBrk="1" fontAlgn="auto" latinLnBrk="0" hangingPunct="1">
                         <a:lnSpc>
-                          <a:spcPct val="100000"/>
+                          <a:spcPct val="90000"/>
                         </a:lnSpc>
                         <a:spcBef>
-                          <a:spcPts val="0"/>
+                          <a:spcPts val="200"/>
                         </a:spcBef>
                         <a:spcAft>
                           <a:spcPts val="0"/>
@@ -30231,7 +30445,14 @@
                     <a:bodyPr/>
                     <a:lstStyle/>
                     <a:p>
-                      <a:pPr algn="l"/>
+                      <a:pPr algn="l">
+                        <a:lnSpc>
+                          <a:spcPct val="90000"/>
+                        </a:lnSpc>
+                        <a:spcBef>
+                          <a:spcPts val="200"/>
+                        </a:spcBef>
+                      </a:pPr>
                       <a:r>
                         <a:rPr lang="en-US" sz="1200" b="0" dirty="0" err="1">
                           <a:solidFill>
@@ -30325,10 +30546,10 @@
                     <a:p>
                       <a:pPr marL="0" marR="0" lvl="0" indent="0" algn="l" defTabSz="584200" rtl="0" eaLnBrk="1" fontAlgn="auto" latinLnBrk="0" hangingPunct="1">
                         <a:lnSpc>
-                          <a:spcPct val="100000"/>
+                          <a:spcPct val="90000"/>
                         </a:lnSpc>
                         <a:spcBef>
-                          <a:spcPts val="0"/>
+                          <a:spcPts val="200"/>
                         </a:spcBef>
                         <a:spcAft>
                           <a:spcPts val="0"/>
@@ -30411,7 +30632,14 @@
                     <a:bodyPr/>
                     <a:lstStyle/>
                     <a:p>
-                      <a:pPr algn="l"/>
+                      <a:pPr algn="l">
+                        <a:lnSpc>
+                          <a:spcPct val="90000"/>
+                        </a:lnSpc>
+                        <a:spcBef>
+                          <a:spcPts val="200"/>
+                        </a:spcBef>
+                      </a:pPr>
                       <a:r>
                         <a:rPr lang="en-US" sz="1200" b="0">
                           <a:solidFill>
@@ -30485,10 +30713,10 @@
                     <a:p>
                       <a:pPr marL="0" marR="0" lvl="0" indent="0" algn="l" defTabSz="584200" rtl="0" eaLnBrk="1" fontAlgn="auto" latinLnBrk="0" hangingPunct="1">
                         <a:lnSpc>
-                          <a:spcPct val="100000"/>
+                          <a:spcPct val="90000"/>
                         </a:lnSpc>
                         <a:spcBef>
-                          <a:spcPts val="0"/>
+                          <a:spcPts val="200"/>
                         </a:spcBef>
                         <a:spcAft>
                           <a:spcPts val="0"/>
@@ -30510,25 +30738,6 @@
                         </a:rPr>
                         <a:t>Column(s) containing values to fill into cells </a:t>
                       </a:r>
-                    </a:p>
-                    <a:p>
-                      <a:pPr marL="0" marR="0" lvl="0" indent="0" algn="l" defTabSz="584200" rtl="0" eaLnBrk="1" fontAlgn="auto" latinLnBrk="0" hangingPunct="1">
-                        <a:lnSpc>
-                          <a:spcPct val="100000"/>
-                        </a:lnSpc>
-                        <a:spcBef>
-                          <a:spcPts val="0"/>
-                        </a:spcBef>
-                        <a:spcAft>
-                          <a:spcPts val="0"/>
-                        </a:spcAft>
-                        <a:buClrTx/>
-                        <a:buSzTx/>
-                        <a:buFontTx/>
-                        <a:buNone/>
-                        <a:tabLst/>
-                        <a:defRPr/>
-                      </a:pPr>
                       <a:r>
                         <a:rPr lang="en-US" sz="1200" dirty="0">
                           <a:solidFill>
@@ -30600,7 +30809,14 @@
                     <a:bodyPr/>
                     <a:lstStyle/>
                     <a:p>
-                      <a:pPr algn="l"/>
+                      <a:pPr algn="l">
+                        <a:lnSpc>
+                          <a:spcPct val="90000"/>
+                        </a:lnSpc>
+                        <a:spcBef>
+                          <a:spcPts val="200"/>
+                        </a:spcBef>
+                      </a:pPr>
                       <a:r>
                         <a:rPr lang="en-US" sz="1200" b="0" dirty="0" err="1">
                           <a:solidFill>
@@ -30704,10 +30920,10 @@
                     <a:p>
                       <a:pPr marL="0" marR="0" lvl="0" indent="0" algn="l" defTabSz="584200" rtl="0" eaLnBrk="1" fontAlgn="auto" latinLnBrk="0" hangingPunct="1">
                         <a:lnSpc>
-                          <a:spcPct val="100000"/>
+                          <a:spcPct val="90000"/>
                         </a:lnSpc>
                         <a:spcBef>
-                          <a:spcPts val="0"/>
+                          <a:spcPts val="200"/>
                         </a:spcBef>
                         <a:spcAft>
                           <a:spcPts val="0"/>

</xml_diff>